<commit_message>
latest version of report slices
</commit_message>
<xml_diff>
--- a/period3/p3.pptx
+++ b/period3/p3.pptx
@@ -8,12 +8,14 @@
     <p:sldId id="256" r:id="rId2"/>
     <p:sldId id="257" r:id="rId3"/>
     <p:sldId id="259" r:id="rId4"/>
-    <p:sldId id="258" r:id="rId5"/>
-    <p:sldId id="260" r:id="rId6"/>
-    <p:sldId id="262" r:id="rId7"/>
-    <p:sldId id="261" r:id="rId8"/>
-    <p:sldId id="263" r:id="rId9"/>
-    <p:sldId id="264" r:id="rId10"/>
+    <p:sldId id="265" r:id="rId5"/>
+    <p:sldId id="258" r:id="rId6"/>
+    <p:sldId id="260" r:id="rId7"/>
+    <p:sldId id="262" r:id="rId8"/>
+    <p:sldId id="261" r:id="rId9"/>
+    <p:sldId id="263" r:id="rId10"/>
+    <p:sldId id="264" r:id="rId11"/>
+    <p:sldId id="267" r:id="rId12"/>
   </p:sldIdLst>
   <p:sldSz cx="12192000" cy="6858000"/>
   <p:notesSz cx="6858000" cy="9144000"/>
@@ -267,7 +269,7 @@
           <a:p>
             <a:fld id="{BCE65AAE-E1CF-4423-93E4-8B9D09CF8934}" type="datetimeFigureOut">
               <a:rPr lang="zh-CN" altLang="en-US" smtClean="0"/>
-              <a:t>2024/5/21</a:t>
+              <a:t>2024/5/22</a:t>
             </a:fld>
             <a:endParaRPr lang="zh-CN" altLang="en-US"/>
           </a:p>
@@ -465,7 +467,7 @@
           <a:p>
             <a:fld id="{BCE65AAE-E1CF-4423-93E4-8B9D09CF8934}" type="datetimeFigureOut">
               <a:rPr lang="zh-CN" altLang="en-US" smtClean="0"/>
-              <a:t>2024/5/21</a:t>
+              <a:t>2024/5/22</a:t>
             </a:fld>
             <a:endParaRPr lang="zh-CN" altLang="en-US"/>
           </a:p>
@@ -673,7 +675,7 @@
           <a:p>
             <a:fld id="{BCE65AAE-E1CF-4423-93E4-8B9D09CF8934}" type="datetimeFigureOut">
               <a:rPr lang="zh-CN" altLang="en-US" smtClean="0"/>
-              <a:t>2024/5/21</a:t>
+              <a:t>2024/5/22</a:t>
             </a:fld>
             <a:endParaRPr lang="zh-CN" altLang="en-US"/>
           </a:p>
@@ -871,7 +873,7 @@
           <a:p>
             <a:fld id="{BCE65AAE-E1CF-4423-93E4-8B9D09CF8934}" type="datetimeFigureOut">
               <a:rPr lang="zh-CN" altLang="en-US" smtClean="0"/>
-              <a:t>2024/5/21</a:t>
+              <a:t>2024/5/22</a:t>
             </a:fld>
             <a:endParaRPr lang="zh-CN" altLang="en-US"/>
           </a:p>
@@ -1146,7 +1148,7 @@
           <a:p>
             <a:fld id="{BCE65AAE-E1CF-4423-93E4-8B9D09CF8934}" type="datetimeFigureOut">
               <a:rPr lang="zh-CN" altLang="en-US" smtClean="0"/>
-              <a:t>2024/5/21</a:t>
+              <a:t>2024/5/22</a:t>
             </a:fld>
             <a:endParaRPr lang="zh-CN" altLang="en-US"/>
           </a:p>
@@ -1411,7 +1413,7 @@
           <a:p>
             <a:fld id="{BCE65AAE-E1CF-4423-93E4-8B9D09CF8934}" type="datetimeFigureOut">
               <a:rPr lang="zh-CN" altLang="en-US" smtClean="0"/>
-              <a:t>2024/5/21</a:t>
+              <a:t>2024/5/22</a:t>
             </a:fld>
             <a:endParaRPr lang="zh-CN" altLang="en-US"/>
           </a:p>
@@ -1823,7 +1825,7 @@
           <a:p>
             <a:fld id="{BCE65AAE-E1CF-4423-93E4-8B9D09CF8934}" type="datetimeFigureOut">
               <a:rPr lang="zh-CN" altLang="en-US" smtClean="0"/>
-              <a:t>2024/5/21</a:t>
+              <a:t>2024/5/22</a:t>
             </a:fld>
             <a:endParaRPr lang="zh-CN" altLang="en-US"/>
           </a:p>
@@ -1964,7 +1966,7 @@
           <a:p>
             <a:fld id="{BCE65AAE-E1CF-4423-93E4-8B9D09CF8934}" type="datetimeFigureOut">
               <a:rPr lang="zh-CN" altLang="en-US" smtClean="0"/>
-              <a:t>2024/5/21</a:t>
+              <a:t>2024/5/22</a:t>
             </a:fld>
             <a:endParaRPr lang="zh-CN" altLang="en-US"/>
           </a:p>
@@ -2077,7 +2079,7 @@
           <a:p>
             <a:fld id="{BCE65AAE-E1CF-4423-93E4-8B9D09CF8934}" type="datetimeFigureOut">
               <a:rPr lang="zh-CN" altLang="en-US" smtClean="0"/>
-              <a:t>2024/5/21</a:t>
+              <a:t>2024/5/22</a:t>
             </a:fld>
             <a:endParaRPr lang="zh-CN" altLang="en-US"/>
           </a:p>
@@ -2388,7 +2390,7 @@
           <a:p>
             <a:fld id="{BCE65AAE-E1CF-4423-93E4-8B9D09CF8934}" type="datetimeFigureOut">
               <a:rPr lang="zh-CN" altLang="en-US" smtClean="0"/>
-              <a:t>2024/5/21</a:t>
+              <a:t>2024/5/22</a:t>
             </a:fld>
             <a:endParaRPr lang="zh-CN" altLang="en-US"/>
           </a:p>
@@ -2676,7 +2678,7 @@
           <a:p>
             <a:fld id="{BCE65AAE-E1CF-4423-93E4-8B9D09CF8934}" type="datetimeFigureOut">
               <a:rPr lang="zh-CN" altLang="en-US" smtClean="0"/>
-              <a:t>2024/5/21</a:t>
+              <a:t>2024/5/22</a:t>
             </a:fld>
             <a:endParaRPr lang="zh-CN" altLang="en-US"/>
           </a:p>
@@ -2917,7 +2919,7 @@
           <a:p>
             <a:fld id="{BCE65AAE-E1CF-4423-93E4-8B9D09CF8934}" type="datetimeFigureOut">
               <a:rPr lang="zh-CN" altLang="en-US" smtClean="0"/>
-              <a:t>2024/5/21</a:t>
+              <a:t>2024/5/22</a:t>
             </a:fld>
             <a:endParaRPr lang="zh-CN" altLang="en-US"/>
           </a:p>
@@ -3408,6 +3410,384 @@
 </p:sld>
 </file>
 
+<file path=ppt/slides/slide10.xml><?xml version="1.0" encoding="utf-8"?>
+<p:sld xmlns:a="http://schemas.openxmlformats.org/drawingml/2006/main" xmlns:r="http://schemas.openxmlformats.org/officeDocument/2006/relationships" xmlns:p="http://schemas.openxmlformats.org/presentationml/2006/main">
+  <p:cSld>
+    <p:spTree>
+      <p:nvGrpSpPr>
+        <p:cNvPr id="1" name=""/>
+        <p:cNvGrpSpPr/>
+        <p:nvPr/>
+      </p:nvGrpSpPr>
+      <p:grpSpPr>
+        <a:xfrm>
+          <a:off x="0" y="0"/>
+          <a:ext cx="0" cy="0"/>
+          <a:chOff x="0" y="0"/>
+          <a:chExt cx="0" cy="0"/>
+        </a:xfrm>
+      </p:grpSpPr>
+      <p:sp>
+        <p:nvSpPr>
+          <p:cNvPr id="2" name="标题 1">
+            <a:extLst>
+              <a:ext uri="{FF2B5EF4-FFF2-40B4-BE49-F238E27FC236}">
+                <a16:creationId xmlns:a16="http://schemas.microsoft.com/office/drawing/2014/main" id="{EDC72C67-092D-8C6D-40A6-BCEC54BAD08C}"/>
+              </a:ext>
+            </a:extLst>
+          </p:cNvPr>
+          <p:cNvSpPr>
+            <a:spLocks noGrp="1"/>
+          </p:cNvSpPr>
+          <p:nvPr>
+            <p:ph type="title"/>
+          </p:nvPr>
+        </p:nvSpPr>
+        <p:spPr/>
+        <p:txBody>
+          <a:bodyPr/>
+          <a:lstStyle/>
+          <a:p>
+            <a:r>
+              <a:rPr lang="en-US" altLang="zh-CN" dirty="0"/>
+              <a:t>【4】</a:t>
+            </a:r>
+            <a:r>
+              <a:rPr lang="zh-CN" altLang="en-US" dirty="0"/>
+              <a:t>上次的问题：</a:t>
+            </a:r>
+            <a:r>
+              <a:rPr lang="en-US" altLang="zh-CN" dirty="0"/>
+              <a:t>source</a:t>
+            </a:r>
+            <a:r>
+              <a:rPr lang="zh-CN" altLang="en-US" dirty="0"/>
+              <a:t>和</a:t>
+            </a:r>
+            <a:r>
+              <a:rPr lang="en-US" altLang="zh-CN" dirty="0"/>
+              <a:t>private</a:t>
+            </a:r>
+            <a:r>
+              <a:rPr lang="zh-CN" altLang="en-US" dirty="0"/>
+              <a:t>情况</a:t>
+            </a:r>
+          </a:p>
+        </p:txBody>
+      </p:sp>
+      <p:sp>
+        <p:nvSpPr>
+          <p:cNvPr id="3" name="内容占位符 2">
+            <a:extLst>
+              <a:ext uri="{FF2B5EF4-FFF2-40B4-BE49-F238E27FC236}">
+                <a16:creationId xmlns:a16="http://schemas.microsoft.com/office/drawing/2014/main" id="{1F455B42-788C-B7A3-CE28-18E11913D584}"/>
+              </a:ext>
+            </a:extLst>
+          </p:cNvPr>
+          <p:cNvSpPr>
+            <a:spLocks noGrp="1"/>
+          </p:cNvSpPr>
+          <p:nvPr>
+            <p:ph idx="1"/>
+          </p:nvPr>
+        </p:nvSpPr>
+        <p:spPr/>
+        <p:txBody>
+          <a:bodyPr/>
+          <a:lstStyle/>
+          <a:p>
+            <a:r>
+              <a:rPr lang="zh-CN" altLang="en-US" dirty="0"/>
+              <a:t>问题抽象：</a:t>
+            </a:r>
+            <a:r>
+              <a:rPr lang="en-US" altLang="zh-CN" dirty="0"/>
+              <a:t>source</a:t>
+            </a:r>
+            <a:r>
+              <a:rPr lang="zh-CN" altLang="en-US" dirty="0"/>
+              <a:t>中只包含</a:t>
+            </a:r>
+            <a:r>
+              <a:rPr lang="en-US" altLang="zh-CN" dirty="0"/>
+              <a:t>common</a:t>
+            </a:r>
+            <a:r>
+              <a:rPr lang="zh-CN" altLang="en-US" dirty="0"/>
+              <a:t>不包含</a:t>
+            </a:r>
+            <a:r>
+              <a:rPr lang="en-US" altLang="zh-CN" dirty="0"/>
+              <a:t>source-private</a:t>
+            </a:r>
+            <a:r>
+              <a:rPr lang="zh-CN" altLang="en-US" dirty="0"/>
+              <a:t>，而</a:t>
+            </a:r>
+            <a:r>
+              <a:rPr lang="en-US" altLang="zh-CN" dirty="0"/>
+              <a:t>target</a:t>
+            </a:r>
+            <a:r>
+              <a:rPr lang="zh-CN" altLang="en-US" dirty="0"/>
+              <a:t>中包含</a:t>
+            </a:r>
+            <a:r>
+              <a:rPr lang="en-US" altLang="zh-CN" dirty="0"/>
+              <a:t>common</a:t>
+            </a:r>
+            <a:r>
+              <a:rPr lang="zh-CN" altLang="en-US" dirty="0"/>
+              <a:t>和</a:t>
+            </a:r>
+            <a:r>
+              <a:rPr lang="en-US" altLang="zh-CN" dirty="0"/>
+              <a:t>target-private</a:t>
+            </a:r>
+            <a:r>
+              <a:rPr lang="zh-CN" altLang="en-US" dirty="0"/>
+              <a:t>，应该怎么办</a:t>
+            </a:r>
+            <a:endParaRPr lang="en-US" altLang="zh-CN" dirty="0"/>
+          </a:p>
+          <a:p>
+            <a:pPr marL="0" indent="0">
+              <a:buNone/>
+            </a:pPr>
+            <a:r>
+              <a:rPr lang="en-US" altLang="zh-CN" dirty="0"/>
+              <a:t>【</a:t>
+            </a:r>
+            <a:r>
+              <a:rPr lang="zh-CN" altLang="en-US" dirty="0"/>
+              <a:t>还是不太明白</a:t>
+            </a:r>
+            <a:r>
+              <a:rPr lang="en-US" altLang="zh-CN" dirty="0"/>
+              <a:t>】</a:t>
+            </a:r>
+          </a:p>
+          <a:p>
+            <a:pPr marL="0" indent="0">
+              <a:buNone/>
+            </a:pPr>
+            <a:endParaRPr lang="en-US" altLang="zh-CN" dirty="0"/>
+          </a:p>
+          <a:p>
+            <a:pPr marL="0" indent="0">
+              <a:buNone/>
+            </a:pPr>
+            <a:r>
+              <a:rPr lang="en-US" altLang="zh-CN" dirty="0"/>
+              <a:t>【</a:t>
+            </a:r>
+            <a:r>
+              <a:rPr lang="zh-CN" altLang="en-US" dirty="0"/>
+              <a:t>一些想法</a:t>
+            </a:r>
+            <a:r>
+              <a:rPr lang="en-US" altLang="zh-CN" dirty="0"/>
+              <a:t>】</a:t>
+            </a:r>
+          </a:p>
+          <a:p>
+            <a:r>
+              <a:rPr lang="en-US" altLang="zh-CN" dirty="0"/>
+              <a:t>Open-partial</a:t>
+            </a:r>
+            <a:r>
+              <a:rPr lang="zh-CN" altLang="en-US" dirty="0"/>
+              <a:t>变成</a:t>
+            </a:r>
+            <a:r>
+              <a:rPr lang="en-US" altLang="zh-CN" dirty="0"/>
+              <a:t>Open-set</a:t>
+            </a:r>
+          </a:p>
+          <a:p>
+            <a:r>
+              <a:rPr lang="zh-CN" altLang="en-US" dirty="0"/>
+              <a:t>利用熵最小化进行</a:t>
+            </a:r>
+            <a:r>
+              <a:rPr lang="en-US" altLang="zh-CN" dirty="0"/>
+              <a:t>common</a:t>
+            </a:r>
+            <a:r>
+              <a:rPr lang="zh-CN" altLang="en-US" dirty="0"/>
+              <a:t>类别的特征对齐</a:t>
+            </a:r>
+            <a:endParaRPr lang="en-US" altLang="zh-CN" dirty="0"/>
+          </a:p>
+          <a:p>
+            <a:r>
+              <a:rPr lang="zh-CN" altLang="en-US" dirty="0"/>
+              <a:t>利用不确定性估计，区分</a:t>
+            </a:r>
+            <a:r>
+              <a:rPr lang="en-US" altLang="zh-CN" dirty="0"/>
+              <a:t>known</a:t>
+            </a:r>
+            <a:r>
+              <a:rPr lang="zh-CN" altLang="en-US" dirty="0"/>
+              <a:t>和</a:t>
+            </a:r>
+            <a:r>
+              <a:rPr lang="en-US" altLang="zh-CN" dirty="0"/>
+              <a:t>unknown</a:t>
+            </a:r>
+            <a:r>
+              <a:rPr lang="zh-CN" altLang="en-US" dirty="0"/>
+              <a:t>的数据</a:t>
+            </a:r>
+          </a:p>
+        </p:txBody>
+      </p:sp>
+    </p:spTree>
+    <p:extLst>
+      <p:ext uri="{BB962C8B-B14F-4D97-AF65-F5344CB8AC3E}">
+        <p14:creationId xmlns:p14="http://schemas.microsoft.com/office/powerpoint/2010/main" val="3250914628"/>
+      </p:ext>
+    </p:extLst>
+  </p:cSld>
+  <p:clrMapOvr>
+    <a:masterClrMapping/>
+  </p:clrMapOvr>
+</p:sld>
+</file>
+
+<file path=ppt/slides/slide11.xml><?xml version="1.0" encoding="utf-8"?>
+<p:sld xmlns:a="http://schemas.openxmlformats.org/drawingml/2006/main" xmlns:r="http://schemas.openxmlformats.org/officeDocument/2006/relationships" xmlns:p="http://schemas.openxmlformats.org/presentationml/2006/main">
+  <p:cSld>
+    <p:spTree>
+      <p:nvGrpSpPr>
+        <p:cNvPr id="1" name=""/>
+        <p:cNvGrpSpPr/>
+        <p:nvPr/>
+      </p:nvGrpSpPr>
+      <p:grpSpPr>
+        <a:xfrm>
+          <a:off x="0" y="0"/>
+          <a:ext cx="0" cy="0"/>
+          <a:chOff x="0" y="0"/>
+          <a:chExt cx="0" cy="0"/>
+        </a:xfrm>
+      </p:grpSpPr>
+      <p:sp>
+        <p:nvSpPr>
+          <p:cNvPr id="2" name="标题 1">
+            <a:extLst>
+              <a:ext uri="{FF2B5EF4-FFF2-40B4-BE49-F238E27FC236}">
+                <a16:creationId xmlns:a16="http://schemas.microsoft.com/office/drawing/2014/main" id="{631F571F-80A3-9B37-038E-235BB0F223F2}"/>
+              </a:ext>
+            </a:extLst>
+          </p:cNvPr>
+          <p:cNvSpPr>
+            <a:spLocks noGrp="1"/>
+          </p:cNvSpPr>
+          <p:nvPr>
+            <p:ph type="title"/>
+          </p:nvPr>
+        </p:nvSpPr>
+        <p:spPr/>
+        <p:txBody>
+          <a:bodyPr/>
+          <a:lstStyle/>
+          <a:p>
+            <a:r>
+              <a:rPr lang="en-US" altLang="zh-CN" dirty="0"/>
+              <a:t>【5】</a:t>
+            </a:r>
+            <a:r>
+              <a:rPr lang="zh-CN" altLang="en-US" dirty="0"/>
+              <a:t>其他</a:t>
+            </a:r>
+          </a:p>
+        </p:txBody>
+      </p:sp>
+      <p:pic>
+        <p:nvPicPr>
+          <p:cNvPr id="5" name="内容占位符 4">
+            <a:extLst>
+              <a:ext uri="{FF2B5EF4-FFF2-40B4-BE49-F238E27FC236}">
+                <a16:creationId xmlns:a16="http://schemas.microsoft.com/office/drawing/2014/main" id="{3AF5AC73-0389-3639-268A-8E0BFB150F25}"/>
+              </a:ext>
+            </a:extLst>
+          </p:cNvPr>
+          <p:cNvPicPr>
+            <a:picLocks noGrp="1" noChangeAspect="1"/>
+          </p:cNvPicPr>
+          <p:nvPr>
+            <p:ph idx="1"/>
+          </p:nvPr>
+        </p:nvPicPr>
+        <p:blipFill rotWithShape="1">
+          <a:blip r:embed="rId2">
+            <a:extLst>
+              <a:ext uri="{28A0092B-C50C-407E-A947-70E740481C1C}">
+                <a14:useLocalDpi xmlns:a14="http://schemas.microsoft.com/office/drawing/2010/main" val="0"/>
+              </a:ext>
+            </a:extLst>
+          </a:blip>
+          <a:srcRect b="22213"/>
+          <a:stretch/>
+        </p:blipFill>
+        <p:spPr>
+          <a:xfrm>
+            <a:off x="72115" y="1449697"/>
+            <a:ext cx="12119885" cy="2737990"/>
+          </a:xfrm>
+        </p:spPr>
+      </p:pic>
+      <p:pic>
+        <p:nvPicPr>
+          <p:cNvPr id="4" name="图片 3">
+            <a:extLst>
+              <a:ext uri="{FF2B5EF4-FFF2-40B4-BE49-F238E27FC236}">
+                <a16:creationId xmlns:a16="http://schemas.microsoft.com/office/drawing/2014/main" id="{89A4FD7A-8D6C-6FD0-A6E6-DDB1E08C5F32}"/>
+              </a:ext>
+            </a:extLst>
+          </p:cNvPr>
+          <p:cNvPicPr>
+            <a:picLocks noChangeAspect="1"/>
+          </p:cNvPicPr>
+          <p:nvPr/>
+        </p:nvPicPr>
+        <p:blipFill>
+          <a:blip r:embed="rId3">
+            <a:extLst>
+              <a:ext uri="{28A0092B-C50C-407E-A947-70E740481C1C}">
+                <a14:useLocalDpi xmlns:a14="http://schemas.microsoft.com/office/drawing/2010/main" val="0"/>
+              </a:ext>
+            </a:extLst>
+          </a:blip>
+          <a:stretch>
+            <a:fillRect/>
+          </a:stretch>
+        </p:blipFill>
+        <p:spPr>
+          <a:xfrm>
+            <a:off x="1866533" y="4686778"/>
+            <a:ext cx="8458933" cy="1806097"/>
+          </a:xfrm>
+          <a:prstGeom prst="rect">
+            <a:avLst/>
+          </a:prstGeom>
+        </p:spPr>
+      </p:pic>
+    </p:spTree>
+    <p:extLst>
+      <p:ext uri="{BB962C8B-B14F-4D97-AF65-F5344CB8AC3E}">
+        <p14:creationId xmlns:p14="http://schemas.microsoft.com/office/powerpoint/2010/main" val="940481654"/>
+      </p:ext>
+    </p:extLst>
+  </p:cSld>
+  <p:clrMapOvr>
+    <a:masterClrMapping/>
+  </p:clrMapOvr>
+</p:sld>
+</file>
+
 <file path=ppt/slides/slide2.xml><?xml version="1.0" encoding="utf-8"?>
 <p:sld xmlns:a="http://schemas.openxmlformats.org/drawingml/2006/main" xmlns:r="http://schemas.openxmlformats.org/officeDocument/2006/relationships" xmlns:p="http://schemas.openxmlformats.org/presentationml/2006/main">
   <p:cSld>
@@ -3619,6 +3999,128 @@
 </file>
 
 <file path=ppt/slides/slide4.xml><?xml version="1.0" encoding="utf-8"?>
+<p:sld xmlns:a="http://schemas.openxmlformats.org/drawingml/2006/main" xmlns:r="http://schemas.openxmlformats.org/officeDocument/2006/relationships" xmlns:p="http://schemas.openxmlformats.org/presentationml/2006/main" show="0">
+  <p:cSld>
+    <p:spTree>
+      <p:nvGrpSpPr>
+        <p:cNvPr id="1" name=""/>
+        <p:cNvGrpSpPr/>
+        <p:nvPr/>
+      </p:nvGrpSpPr>
+      <p:grpSpPr>
+        <a:xfrm>
+          <a:off x="0" y="0"/>
+          <a:ext cx="0" cy="0"/>
+          <a:chOff x="0" y="0"/>
+          <a:chExt cx="0" cy="0"/>
+        </a:xfrm>
+      </p:grpSpPr>
+      <p:sp>
+        <p:nvSpPr>
+          <p:cNvPr id="4" name="AutoShape 2">
+            <a:extLst>
+              <a:ext uri="{FF2B5EF4-FFF2-40B4-BE49-F238E27FC236}">
+                <a16:creationId xmlns:a16="http://schemas.microsoft.com/office/drawing/2014/main" id="{38D45B0B-833E-4368-D5BC-8C591616C570}"/>
+              </a:ext>
+            </a:extLst>
+          </p:cNvPr>
+          <p:cNvSpPr>
+            <a:spLocks noChangeAspect="1" noChangeArrowheads="1"/>
+          </p:cNvSpPr>
+          <p:nvPr/>
+        </p:nvSpPr>
+        <p:spPr bwMode="auto">
+          <a:xfrm>
+            <a:off x="5943600" y="3276600"/>
+            <a:ext cx="304800" cy="304800"/>
+          </a:xfrm>
+          <a:prstGeom prst="rect">
+            <a:avLst/>
+          </a:prstGeom>
+          <a:noFill/>
+          <a:extLst>
+            <a:ext uri="{909E8E84-426E-40DD-AFC4-6F175D3DCCD1}">
+              <a14:hiddenFill xmlns:a14="http://schemas.microsoft.com/office/drawing/2010/main">
+                <a:solidFill>
+                  <a:srgbClr val="FFFFFF"/>
+                </a:solidFill>
+              </a14:hiddenFill>
+            </a:ext>
+          </a:extLst>
+        </p:spPr>
+        <p:txBody>
+          <a:bodyPr vert="horz" wrap="square" lIns="91440" tIns="45720" rIns="91440" bIns="45720" numCol="1" anchor="t" anchorCtr="0" compatLnSpc="1">
+            <a:prstTxWarp prst="textNoShape">
+              <a:avLst/>
+            </a:prstTxWarp>
+          </a:bodyPr>
+          <a:lstStyle/>
+          <a:p>
+            <a:endParaRPr lang="zh-CN" altLang="en-US"/>
+          </a:p>
+        </p:txBody>
+      </p:sp>
+      <p:pic>
+        <p:nvPicPr>
+          <p:cNvPr id="1028" name="Picture 4">
+            <a:extLst>
+              <a:ext uri="{FF2B5EF4-FFF2-40B4-BE49-F238E27FC236}">
+                <a16:creationId xmlns:a16="http://schemas.microsoft.com/office/drawing/2014/main" id="{8EB369E7-8F2C-7D5C-BED3-F9EC811949BE}"/>
+              </a:ext>
+            </a:extLst>
+          </p:cNvPr>
+          <p:cNvPicPr>
+            <a:picLocks noChangeAspect="1" noChangeArrowheads="1"/>
+          </p:cNvPicPr>
+          <p:nvPr/>
+        </p:nvPicPr>
+        <p:blipFill>
+          <a:blip r:embed="rId2">
+            <a:extLst>
+              <a:ext uri="{28A0092B-C50C-407E-A947-70E740481C1C}">
+                <a14:useLocalDpi xmlns:a14="http://schemas.microsoft.com/office/drawing/2010/main" val="0"/>
+              </a:ext>
+            </a:extLst>
+          </a:blip>
+          <a:srcRect/>
+          <a:stretch>
+            <a:fillRect/>
+          </a:stretch>
+        </p:blipFill>
+        <p:spPr bwMode="auto">
+          <a:xfrm>
+            <a:off x="0" y="1166018"/>
+            <a:ext cx="12192000" cy="4830763"/>
+          </a:xfrm>
+          <a:prstGeom prst="rect">
+            <a:avLst/>
+          </a:prstGeom>
+          <a:noFill/>
+          <a:extLst>
+            <a:ext uri="{909E8E84-426E-40DD-AFC4-6F175D3DCCD1}">
+              <a14:hiddenFill xmlns:a14="http://schemas.microsoft.com/office/drawing/2010/main">
+                <a:solidFill>
+                  <a:srgbClr val="FFFFFF"/>
+                </a:solidFill>
+              </a14:hiddenFill>
+            </a:ext>
+          </a:extLst>
+        </p:spPr>
+      </p:pic>
+    </p:spTree>
+    <p:extLst>
+      <p:ext uri="{BB962C8B-B14F-4D97-AF65-F5344CB8AC3E}">
+        <p14:creationId xmlns:p14="http://schemas.microsoft.com/office/powerpoint/2010/main" val="2120241468"/>
+      </p:ext>
+    </p:extLst>
+  </p:cSld>
+  <p:clrMapOvr>
+    <a:masterClrMapping/>
+  </p:clrMapOvr>
+</p:sld>
+</file>
+
+<file path=ppt/slides/slide5.xml><?xml version="1.0" encoding="utf-8"?>
 <p:sld xmlns:a="http://schemas.openxmlformats.org/drawingml/2006/main" xmlns:r="http://schemas.openxmlformats.org/officeDocument/2006/relationships" xmlns:p="http://schemas.openxmlformats.org/presentationml/2006/main">
   <p:cSld>
     <p:spTree>
@@ -3691,7 +4193,7 @@
             <p:ph idx="1"/>
             <p:extLst>
               <p:ext uri="{D42A27DB-BD31-4B8C-83A1-F6EECF244321}">
-                <p14:modId xmlns:p14="http://schemas.microsoft.com/office/powerpoint/2010/main" val="2927525314"/>
+                <p14:modId xmlns:p14="http://schemas.microsoft.com/office/powerpoint/2010/main" val="2600142266"/>
               </p:ext>
             </p:extLst>
           </p:nvPr>
@@ -3893,8 +4395,8 @@
                     <a:p>
                       <a:pPr algn="ctr"/>
                       <a:r>
-                        <a:rPr lang="en-US" altLang="zh-CN" sz="4000" dirty="0"/>
-                        <a:t>0.893</a:t>
+                        <a:rPr lang="en-US" altLang="zh-CN" sz="4000"/>
+                        <a:t>0.895</a:t>
                       </a:r>
                       <a:endParaRPr lang="zh-CN" altLang="en-US" sz="4000" dirty="0"/>
                     </a:p>
@@ -4217,7 +4719,7 @@
 </p:sld>
 </file>
 
-<file path=ppt/slides/slide5.xml><?xml version="1.0" encoding="utf-8"?>
+<file path=ppt/slides/slide6.xml><?xml version="1.0" encoding="utf-8"?>
 <p:sld xmlns:a="http://schemas.openxmlformats.org/drawingml/2006/main" xmlns:r="http://schemas.openxmlformats.org/officeDocument/2006/relationships" xmlns:p="http://schemas.openxmlformats.org/presentationml/2006/main">
   <p:cSld>
     <p:spTree>
@@ -4913,172 +5415,6 @@
 </p:sld>
 </file>
 
-<file path=ppt/slides/slide6.xml><?xml version="1.0" encoding="utf-8"?>
-<p:sld xmlns:a="http://schemas.openxmlformats.org/drawingml/2006/main" xmlns:r="http://schemas.openxmlformats.org/officeDocument/2006/relationships" xmlns:p="http://schemas.openxmlformats.org/presentationml/2006/main">
-  <p:cSld>
-    <p:spTree>
-      <p:nvGrpSpPr>
-        <p:cNvPr id="1" name=""/>
-        <p:cNvGrpSpPr/>
-        <p:nvPr/>
-      </p:nvGrpSpPr>
-      <p:grpSpPr>
-        <a:xfrm>
-          <a:off x="0" y="0"/>
-          <a:ext cx="0" cy="0"/>
-          <a:chOff x="0" y="0"/>
-          <a:chExt cx="0" cy="0"/>
-        </a:xfrm>
-      </p:grpSpPr>
-      <p:sp>
-        <p:nvSpPr>
-          <p:cNvPr id="2" name="标题 1">
-            <a:extLst>
-              <a:ext uri="{FF2B5EF4-FFF2-40B4-BE49-F238E27FC236}">
-                <a16:creationId xmlns:a16="http://schemas.microsoft.com/office/drawing/2014/main" id="{FB5DCF27-0535-3003-F41E-28B7533BE951}"/>
-              </a:ext>
-            </a:extLst>
-          </p:cNvPr>
-          <p:cNvSpPr>
-            <a:spLocks noGrp="1"/>
-          </p:cNvSpPr>
-          <p:nvPr>
-            <p:ph type="title"/>
-          </p:nvPr>
-        </p:nvSpPr>
-        <p:spPr/>
-        <p:txBody>
-          <a:bodyPr/>
-          <a:lstStyle/>
-          <a:p>
-            <a:r>
-              <a:rPr lang="en-US" altLang="zh-CN" dirty="0"/>
-              <a:t>【2】Office-Home</a:t>
-            </a:r>
-            <a:r>
-              <a:rPr lang="zh-CN" altLang="en-US" dirty="0"/>
-              <a:t>数据集的</a:t>
-            </a:r>
-            <a:r>
-              <a:rPr lang="en-US" altLang="zh-CN" dirty="0"/>
-              <a:t>OPDA</a:t>
-            </a:r>
-            <a:r>
-              <a:rPr lang="zh-CN" altLang="en-US" dirty="0"/>
-              <a:t>结果</a:t>
-            </a:r>
-          </a:p>
-        </p:txBody>
-      </p:sp>
-      <p:sp>
-        <p:nvSpPr>
-          <p:cNvPr id="6" name="内容占位符 5">
-            <a:extLst>
-              <a:ext uri="{FF2B5EF4-FFF2-40B4-BE49-F238E27FC236}">
-                <a16:creationId xmlns:a16="http://schemas.microsoft.com/office/drawing/2014/main" id="{8539DB4C-F37B-B759-9967-B669D11F0536}"/>
-              </a:ext>
-            </a:extLst>
-          </p:cNvPr>
-          <p:cNvSpPr>
-            <a:spLocks noGrp="1"/>
-          </p:cNvSpPr>
-          <p:nvPr>
-            <p:ph idx="1"/>
-          </p:nvPr>
-        </p:nvSpPr>
-        <p:spPr/>
-        <p:txBody>
-          <a:bodyPr/>
-          <a:lstStyle/>
-          <a:p>
-            <a:r>
-              <a:rPr lang="zh-CN" altLang="en-US" dirty="0"/>
-              <a:t>运行结果与论文结果对比，浮动有的地方超过</a:t>
-            </a:r>
-            <a:r>
-              <a:rPr lang="en-US" altLang="zh-CN" dirty="0"/>
-              <a:t>5%</a:t>
-            </a:r>
-          </a:p>
-          <a:p>
-            <a:endParaRPr lang="en-US" altLang="zh-CN" dirty="0"/>
-          </a:p>
-          <a:p>
-            <a:pPr marL="0" indent="0">
-              <a:buNone/>
-            </a:pPr>
-            <a:r>
-              <a:rPr lang="en-US" altLang="zh-CN" dirty="0"/>
-              <a:t>【</a:t>
-            </a:r>
-            <a:r>
-              <a:rPr lang="zh-CN" altLang="en-US" dirty="0"/>
-              <a:t>其他问题</a:t>
-            </a:r>
-            <a:r>
-              <a:rPr lang="en-US" altLang="zh-CN" dirty="0"/>
-              <a:t>】</a:t>
-            </a:r>
-          </a:p>
-          <a:p>
-            <a:r>
-              <a:rPr lang="zh-CN" altLang="en-US" dirty="0"/>
-              <a:t>作者未提到多次实验取平均值（</a:t>
-            </a:r>
-            <a:r>
-              <a:rPr lang="en-US" altLang="zh-CN" dirty="0"/>
-              <a:t>average</a:t>
-            </a:r>
-            <a:r>
-              <a:rPr lang="zh-CN" altLang="en-US" dirty="0"/>
-              <a:t>）</a:t>
-            </a:r>
-            <a:endParaRPr lang="en-US" altLang="zh-CN" dirty="0"/>
-          </a:p>
-          <a:p>
-            <a:r>
-              <a:rPr lang="zh-CN" altLang="en-US" dirty="0"/>
-              <a:t>感觉作者应该给一个</a:t>
-            </a:r>
-            <a:r>
-              <a:rPr lang="en-US" altLang="zh-CN" dirty="0"/>
-              <a:t>algorithm</a:t>
-            </a:r>
-            <a:r>
-              <a:rPr lang="zh-CN" altLang="en-US" dirty="0"/>
-              <a:t>的表</a:t>
-            </a:r>
-            <a:endParaRPr lang="en-US" altLang="zh-CN" dirty="0"/>
-          </a:p>
-          <a:p>
-            <a:r>
-              <a:rPr lang="zh-CN" altLang="en-US" dirty="0"/>
-              <a:t>代码里面没看到有亲和力学习方法（</a:t>
-            </a:r>
-            <a:r>
-              <a:rPr lang="en-US" altLang="zh-CN" dirty="0"/>
-              <a:t>contrastive affinity learning</a:t>
-            </a:r>
-            <a:r>
-              <a:rPr lang="zh-CN" altLang="en-US" dirty="0"/>
-              <a:t>）的损失</a:t>
-            </a:r>
-          </a:p>
-        </p:txBody>
-      </p:sp>
-    </p:spTree>
-    <p:extLst>
-      <p:ext uri="{BB962C8B-B14F-4D97-AF65-F5344CB8AC3E}">
-        <p14:creationId xmlns:p14="http://schemas.microsoft.com/office/powerpoint/2010/main" val="1860360174"/>
-      </p:ext>
-    </p:extLst>
-  </p:cSld>
-  <p:clrMapOvr>
-    <a:masterClrMapping/>
-  </p:clrMapOvr>
-</p:sld>
-</file>
-
 <file path=ppt/slides/slide7.xml><?xml version="1.0" encoding="utf-8"?>
 <p:sld xmlns:a="http://schemas.openxmlformats.org/drawingml/2006/main" xmlns:r="http://schemas.openxmlformats.org/officeDocument/2006/relationships" xmlns:p="http://schemas.openxmlformats.org/presentationml/2006/main">
   <p:cSld>
@@ -5101,7 +5437,7 @@
           <p:cNvPr id="2" name="标题 1">
             <a:extLst>
               <a:ext uri="{FF2B5EF4-FFF2-40B4-BE49-F238E27FC236}">
-                <a16:creationId xmlns:a16="http://schemas.microsoft.com/office/drawing/2014/main" id="{64A1F0CF-5DA0-81A7-BE2F-47AB2747048C}"/>
+                <a16:creationId xmlns:a16="http://schemas.microsoft.com/office/drawing/2014/main" id="{FB5DCF27-0535-3003-F41E-28B7533BE951}"/>
               </a:ext>
             </a:extLst>
           </p:cNvPr>
@@ -5119,21 +5455,29 @@
           <a:p>
             <a:r>
               <a:rPr lang="en-US" altLang="zh-CN" dirty="0"/>
-              <a:t>【3】</a:t>
+              <a:t>【2】Office-Home</a:t>
             </a:r>
             <a:r>
               <a:rPr lang="zh-CN" altLang="en-US" dirty="0"/>
-              <a:t>代码复现</a:t>
-            </a:r>
-          </a:p>
-        </p:txBody>
-      </p:sp>
-      <p:sp>
-        <p:nvSpPr>
-          <p:cNvPr id="3" name="内容占位符 2">
-            <a:extLst>
-              <a:ext uri="{FF2B5EF4-FFF2-40B4-BE49-F238E27FC236}">
-                <a16:creationId xmlns:a16="http://schemas.microsoft.com/office/drawing/2014/main" id="{3F69BBE5-E7BE-7D3F-A101-23681E2BF489}"/>
+              <a:t>数据集的</a:t>
+            </a:r>
+            <a:r>
+              <a:rPr lang="en-US" altLang="zh-CN" dirty="0"/>
+              <a:t>OPDA</a:t>
+            </a:r>
+            <a:r>
+              <a:rPr lang="zh-CN" altLang="en-US" dirty="0"/>
+              <a:t>结果</a:t>
+            </a:r>
+          </a:p>
+        </p:txBody>
+      </p:sp>
+      <p:sp>
+        <p:nvSpPr>
+          <p:cNvPr id="6" name="内容占位符 5">
+            <a:extLst>
+              <a:ext uri="{FF2B5EF4-FFF2-40B4-BE49-F238E27FC236}">
+                <a16:creationId xmlns:a16="http://schemas.microsoft.com/office/drawing/2014/main" id="{8539DB4C-F37B-B759-9967-B669D11F0536}"/>
               </a:ext>
             </a:extLst>
           </p:cNvPr>
@@ -5151,29 +5495,127 @@
           <a:p>
             <a:r>
               <a:rPr lang="zh-CN" altLang="en-US" dirty="0"/>
-              <a:t>按照作者的源代码尝试了复现</a:t>
-            </a:r>
+              <a:t>运行结果与论文结果对比，</a:t>
+            </a:r>
+            <a:r>
+              <a:rPr lang="zh-CN" altLang="en-US" dirty="0">
+                <a:solidFill>
+                  <a:srgbClr val="FF0000"/>
+                </a:solidFill>
+              </a:rPr>
+              <a:t>浮动</a:t>
+            </a:r>
+            <a:r>
+              <a:rPr lang="zh-CN" altLang="en-US" dirty="0"/>
+              <a:t>有的地方超过</a:t>
+            </a:r>
+            <a:r>
+              <a:rPr lang="en-US" altLang="zh-CN" dirty="0"/>
+              <a:t>5%</a:t>
+            </a:r>
+          </a:p>
+          <a:p>
             <a:endParaRPr lang="en-US" altLang="zh-CN" dirty="0"/>
           </a:p>
           <a:p>
+            <a:pPr marL="0" indent="0">
+              <a:buNone/>
+            </a:pPr>
+            <a:r>
+              <a:rPr lang="en-US" altLang="zh-CN" dirty="0"/>
+              <a:t>【</a:t>
+            </a:r>
             <a:r>
               <a:rPr lang="zh-CN" altLang="en-US" dirty="0"/>
-              <a:t>个人水平不太行，保留了好多代码风格痕迹</a:t>
+              <a:t>其他问题</a:t>
+            </a:r>
+            <a:r>
+              <a:rPr lang="en-US" altLang="zh-CN" dirty="0"/>
+              <a:t>】</a:t>
+            </a:r>
+          </a:p>
+          <a:p>
+            <a:r>
+              <a:rPr lang="zh-CN" altLang="en-US" dirty="0"/>
+              <a:t>作者未提到</a:t>
+            </a:r>
+            <a:r>
+              <a:rPr lang="zh-CN" altLang="en-US" dirty="0">
+                <a:solidFill>
+                  <a:srgbClr val="FF0000"/>
+                </a:solidFill>
+              </a:rPr>
+              <a:t>多次实验取平均值</a:t>
+            </a:r>
+            <a:r>
+              <a:rPr lang="zh-CN" altLang="en-US" dirty="0"/>
+              <a:t>（</a:t>
+            </a:r>
+            <a:r>
+              <a:rPr lang="en-US" altLang="zh-CN" dirty="0"/>
+              <a:t>average</a:t>
+            </a:r>
+            <a:r>
+              <a:rPr lang="zh-CN" altLang="en-US" dirty="0"/>
+              <a:t>）</a:t>
             </a:r>
             <a:endParaRPr lang="en-US" altLang="zh-CN" dirty="0"/>
           </a:p>
           <a:p>
-            <a:pPr marL="0" indent="0">
-              <a:buNone/>
-            </a:pPr>
-            <a:endParaRPr lang="zh-CN" altLang="en-US" dirty="0"/>
+            <a:r>
+              <a:rPr lang="zh-CN" altLang="en-US" dirty="0"/>
+              <a:t>感觉作者应该给一个</a:t>
+            </a:r>
+            <a:r>
+              <a:rPr lang="en-US" altLang="zh-CN" dirty="0">
+                <a:solidFill>
+                  <a:srgbClr val="FF0000"/>
+                </a:solidFill>
+              </a:rPr>
+              <a:t>algorithm</a:t>
+            </a:r>
+            <a:r>
+              <a:rPr lang="zh-CN" altLang="en-US" dirty="0">
+                <a:solidFill>
+                  <a:srgbClr val="FF0000"/>
+                </a:solidFill>
+              </a:rPr>
+              <a:t>的表</a:t>
+            </a:r>
+            <a:endParaRPr lang="en-US" altLang="zh-CN" dirty="0">
+              <a:solidFill>
+                <a:srgbClr val="FF0000"/>
+              </a:solidFill>
+            </a:endParaRPr>
+          </a:p>
+          <a:p>
+            <a:r>
+              <a:rPr lang="zh-CN" altLang="en-US" dirty="0"/>
+              <a:t>代码里面没看到有亲和力学习方法（</a:t>
+            </a:r>
+            <a:r>
+              <a:rPr lang="en-US" altLang="zh-CN" dirty="0"/>
+              <a:t>contrastive affinity learning</a:t>
+            </a:r>
+            <a:r>
+              <a:rPr lang="zh-CN" altLang="en-US" dirty="0"/>
+              <a:t>）的</a:t>
+            </a:r>
+            <a:r>
+              <a:rPr lang="zh-CN" altLang="en-US" dirty="0">
+                <a:solidFill>
+                  <a:srgbClr val="FF0000"/>
+                </a:solidFill>
+              </a:rPr>
+              <a:t>损失</a:t>
+            </a:r>
           </a:p>
         </p:txBody>
       </p:sp>
     </p:spTree>
     <p:extLst>
       <p:ext uri="{BB962C8B-B14F-4D97-AF65-F5344CB8AC3E}">
-        <p14:creationId xmlns:p14="http://schemas.microsoft.com/office/powerpoint/2010/main" val="1696117167"/>
+        <p14:creationId xmlns:p14="http://schemas.microsoft.com/office/powerpoint/2010/main" val="1860360174"/>
       </p:ext>
     </p:extLst>
   </p:cSld>
@@ -5223,239 +5665,61 @@
           <a:p>
             <a:r>
               <a:rPr lang="en-US" altLang="zh-CN" dirty="0"/>
-              <a:t>【4】</a:t>
+              <a:t>【3】</a:t>
             </a:r>
             <a:r>
               <a:rPr lang="zh-CN" altLang="en-US" dirty="0"/>
-              <a:t>上次的问题：</a:t>
-            </a:r>
-            <a:r>
-              <a:rPr lang="en-US" altLang="zh-CN" dirty="0"/>
-              <a:t>LEAD</a:t>
-            </a:r>
+              <a:t>代码复现</a:t>
+            </a:r>
+          </a:p>
+        </p:txBody>
+      </p:sp>
+      <p:sp>
+        <p:nvSpPr>
+          <p:cNvPr id="3" name="内容占位符 2">
+            <a:extLst>
+              <a:ext uri="{FF2B5EF4-FFF2-40B4-BE49-F238E27FC236}">
+                <a16:creationId xmlns:a16="http://schemas.microsoft.com/office/drawing/2014/main" id="{3F69BBE5-E7BE-7D3F-A101-23681E2BF489}"/>
+              </a:ext>
+            </a:extLst>
+          </p:cNvPr>
+          <p:cNvSpPr>
+            <a:spLocks noGrp="1"/>
+          </p:cNvSpPr>
+          <p:nvPr>
+            <p:ph idx="1"/>
+          </p:nvPr>
+        </p:nvSpPr>
+        <p:spPr/>
+        <p:txBody>
+          <a:bodyPr/>
+          <a:lstStyle/>
+          <a:p>
             <a:r>
               <a:rPr lang="zh-CN" altLang="en-US" dirty="0"/>
-              <a:t>中的双峰</a:t>
-            </a:r>
-          </a:p>
-        </p:txBody>
-      </p:sp>
-      <p:sp>
-        <p:nvSpPr>
-          <p:cNvPr id="3" name="内容占位符 2">
-            <a:extLst>
-              <a:ext uri="{FF2B5EF4-FFF2-40B4-BE49-F238E27FC236}">
-                <a16:creationId xmlns:a16="http://schemas.microsoft.com/office/drawing/2014/main" id="{3F69BBE5-E7BE-7D3F-A101-23681E2BF489}"/>
-              </a:ext>
-            </a:extLst>
-          </p:cNvPr>
-          <p:cNvSpPr>
-            <a:spLocks noGrp="1"/>
-          </p:cNvSpPr>
-          <p:nvPr>
-            <p:ph idx="1"/>
-          </p:nvPr>
-        </p:nvSpPr>
-        <p:spPr/>
-        <p:txBody>
-          <a:bodyPr/>
-          <a:lstStyle/>
+              <a:t>按照作者的源代码尝试了复现</a:t>
+            </a:r>
+            <a:endParaRPr lang="en-US" altLang="zh-CN" dirty="0"/>
+          </a:p>
           <a:p>
             <a:r>
               <a:rPr lang="zh-CN" altLang="en-US" dirty="0"/>
-              <a:t>对分类器的权重矩阵进行了</a:t>
-            </a:r>
-            <a:r>
-              <a:rPr lang="en-US" altLang="zh-CN" dirty="0"/>
-              <a:t>SVD</a:t>
-            </a:r>
-            <a:r>
-              <a:rPr lang="zh-CN" altLang="en-US" dirty="0"/>
-              <a:t>，提取到</a:t>
-            </a:r>
-            <a:r>
-              <a:rPr lang="zh-CN" altLang="en-US" dirty="0">
-                <a:solidFill>
-                  <a:srgbClr val="FF0000"/>
-                </a:solidFill>
-              </a:rPr>
-              <a:t>右奇异矩阵</a:t>
-            </a:r>
-            <a:endParaRPr lang="en-US" altLang="zh-CN" dirty="0">
-              <a:solidFill>
-                <a:srgbClr val="FF0000"/>
-              </a:solidFill>
-            </a:endParaRPr>
-          </a:p>
-          <a:p>
-            <a:r>
-              <a:rPr lang="zh-CN" altLang="en-US" dirty="0"/>
-              <a:t>右奇异矩阵的前</a:t>
-            </a:r>
-            <a:r>
-              <a:rPr lang="en-US" altLang="zh-CN" dirty="0"/>
-              <a:t>C</a:t>
-            </a:r>
-            <a:r>
-              <a:rPr lang="zh-CN" altLang="en-US" dirty="0"/>
-              <a:t>组为已知空间（行空间），后</a:t>
-            </a:r>
-            <a:r>
-              <a:rPr lang="en-US" altLang="zh-CN" dirty="0"/>
-              <a:t>(D-C)</a:t>
-            </a:r>
-            <a:r>
-              <a:rPr lang="zh-CN" altLang="en-US" dirty="0"/>
-              <a:t>组为未知空间（零空间），而</a:t>
-            </a:r>
-            <a:r>
-              <a:rPr lang="zh-CN" altLang="en-US" dirty="0">
-                <a:solidFill>
-                  <a:srgbClr val="FF0000"/>
-                </a:solidFill>
-              </a:rPr>
-              <a:t>未知空间的</a:t>
-            </a:r>
-            <a:r>
-              <a:rPr lang="en-US" altLang="zh-CN" dirty="0">
-                <a:solidFill>
-                  <a:srgbClr val="FF0000"/>
-                </a:solidFill>
-              </a:rPr>
-              <a:t>2</a:t>
-            </a:r>
-            <a:r>
-              <a:rPr lang="zh-CN" altLang="en-US" dirty="0">
-                <a:solidFill>
-                  <a:srgbClr val="FF0000"/>
-                </a:solidFill>
-              </a:rPr>
-              <a:t>范数呈现双峰</a:t>
-            </a:r>
-            <a:endParaRPr lang="en-US" altLang="zh-CN" dirty="0">
-              <a:solidFill>
-                <a:srgbClr val="FF0000"/>
-              </a:solidFill>
-            </a:endParaRPr>
-          </a:p>
-          <a:p>
-            <a:r>
-              <a:rPr lang="zh-CN" altLang="en-US" dirty="0"/>
-              <a:t>通过</a:t>
-            </a:r>
-            <a:r>
-              <a:rPr lang="en-US" altLang="zh-CN" dirty="0"/>
-              <a:t>GMM</a:t>
-            </a:r>
-            <a:r>
-              <a:rPr lang="zh-CN" altLang="en-US" dirty="0"/>
-              <a:t>可将</a:t>
-            </a:r>
-            <a:r>
-              <a:rPr lang="en-US" altLang="zh-CN" dirty="0"/>
-              <a:t>2</a:t>
-            </a:r>
-            <a:r>
-              <a:rPr lang="zh-CN" altLang="en-US" dirty="0"/>
-              <a:t>范数的分布，剥离为</a:t>
-            </a:r>
-            <a:r>
-              <a:rPr lang="en-US" altLang="zh-CN" dirty="0"/>
-              <a:t>2</a:t>
-            </a:r>
-            <a:r>
-              <a:rPr lang="zh-CN" altLang="en-US" dirty="0"/>
-              <a:t>个部分，未知空间中的</a:t>
-            </a:r>
-            <a:r>
-              <a:rPr lang="en-US" altLang="zh-CN" dirty="0"/>
-              <a:t>common</a:t>
-            </a:r>
-            <a:r>
-              <a:rPr lang="zh-CN" altLang="en-US" dirty="0"/>
-              <a:t> </a:t>
-            </a:r>
-            <a:r>
-              <a:rPr lang="en-US" altLang="zh-CN" dirty="0"/>
-              <a:t>+ </a:t>
-            </a:r>
-            <a:r>
-              <a:rPr lang="zh-CN" altLang="en-US" dirty="0"/>
-              <a:t>未知空间中的</a:t>
-            </a:r>
-            <a:r>
-              <a:rPr lang="en-US" altLang="zh-CN" dirty="0"/>
-              <a:t>private</a:t>
-            </a:r>
-          </a:p>
-          <a:p>
-            <a:r>
-              <a:rPr lang="zh-CN" altLang="en-US" dirty="0"/>
-              <a:t>双峰分布图针对的对象，均是</a:t>
-            </a:r>
-            <a:r>
-              <a:rPr lang="en-US" altLang="zh-CN" dirty="0">
-                <a:solidFill>
-                  <a:srgbClr val="FF0000"/>
-                </a:solidFill>
-              </a:rPr>
-              <a:t>target</a:t>
-            </a:r>
-            <a:r>
-              <a:rPr lang="zh-CN" altLang="en-US" dirty="0">
-                <a:solidFill>
-                  <a:srgbClr val="FF0000"/>
-                </a:solidFill>
-              </a:rPr>
-              <a:t>上的数据</a:t>
-            </a:r>
-            <a:endParaRPr lang="en-US" altLang="zh-CN" dirty="0">
-              <a:solidFill>
-                <a:srgbClr val="FF0000"/>
-              </a:solidFill>
-            </a:endParaRPr>
-          </a:p>
-          <a:p>
-            <a:r>
-              <a:rPr lang="zh-CN" altLang="en-US" dirty="0"/>
-              <a:t>实例化边界，可通过</a:t>
-            </a:r>
-            <a:r>
-              <a:rPr lang="en-US" altLang="zh-CN" dirty="0"/>
-              <a:t>private</a:t>
-            </a:r>
-            <a:r>
-              <a:rPr lang="zh-CN" altLang="en-US" dirty="0"/>
-              <a:t>的均值和第</a:t>
-            </a:r>
-            <a:r>
-              <a:rPr lang="en-US" altLang="zh-CN" dirty="0"/>
-              <a:t>c</a:t>
-            </a:r>
-            <a:r>
-              <a:rPr lang="zh-CN" altLang="en-US" dirty="0"/>
-              <a:t>类的未知空间</a:t>
-            </a:r>
-            <a:r>
-              <a:rPr lang="en-US" altLang="zh-CN" dirty="0"/>
-              <a:t>2</a:t>
-            </a:r>
-            <a:r>
-              <a:rPr lang="zh-CN" altLang="en-US" dirty="0"/>
-              <a:t>范数进行计算</a:t>
-            </a:r>
-            <a:endParaRPr lang="zh-CN" altLang="en-US" dirty="0">
-              <a:solidFill>
-                <a:srgbClr val="FF0000"/>
-              </a:solidFill>
-            </a:endParaRPr>
+              <a:t>个人水平不太行，保留了好多代码风格痕迹</a:t>
+            </a:r>
+            <a:endParaRPr lang="en-US" altLang="zh-CN" dirty="0"/>
+          </a:p>
+          <a:p>
+            <a:pPr marL="0" indent="0">
+              <a:buNone/>
+            </a:pPr>
+            <a:endParaRPr lang="zh-CN" altLang="en-US" dirty="0"/>
           </a:p>
         </p:txBody>
       </p:sp>
     </p:spTree>
     <p:extLst>
       <p:ext uri="{BB962C8B-B14F-4D97-AF65-F5344CB8AC3E}">
-        <p14:creationId xmlns:p14="http://schemas.microsoft.com/office/powerpoint/2010/main" val="1698240290"/>
+        <p14:creationId xmlns:p14="http://schemas.microsoft.com/office/powerpoint/2010/main" val="1696117167"/>
       </p:ext>
     </p:extLst>
   </p:cSld>
@@ -5487,7 +5751,7 @@
           <p:cNvPr id="2" name="标题 1">
             <a:extLst>
               <a:ext uri="{FF2B5EF4-FFF2-40B4-BE49-F238E27FC236}">
-                <a16:creationId xmlns:a16="http://schemas.microsoft.com/office/drawing/2014/main" id="{EDC72C67-092D-8C6D-40A6-BCEC54BAD08C}"/>
+                <a16:creationId xmlns:a16="http://schemas.microsoft.com/office/drawing/2014/main" id="{64A1F0CF-5DA0-81A7-BE2F-47AB2747048C}"/>
               </a:ext>
             </a:extLst>
           </p:cNvPr>
@@ -5513,178 +5777,231 @@
             </a:r>
             <a:r>
               <a:rPr lang="en-US" altLang="zh-CN" dirty="0"/>
-              <a:t>source</a:t>
+              <a:t>LEAD</a:t>
             </a:r>
             <a:r>
               <a:rPr lang="zh-CN" altLang="en-US" dirty="0"/>
-              <a:t>和</a:t>
+              <a:t>中的双峰</a:t>
+            </a:r>
+          </a:p>
+        </p:txBody>
+      </p:sp>
+      <p:sp>
+        <p:nvSpPr>
+          <p:cNvPr id="3" name="内容占位符 2">
+            <a:extLst>
+              <a:ext uri="{FF2B5EF4-FFF2-40B4-BE49-F238E27FC236}">
+                <a16:creationId xmlns:a16="http://schemas.microsoft.com/office/drawing/2014/main" id="{3F69BBE5-E7BE-7D3F-A101-23681E2BF489}"/>
+              </a:ext>
+            </a:extLst>
+          </p:cNvPr>
+          <p:cNvSpPr>
+            <a:spLocks noGrp="1"/>
+          </p:cNvSpPr>
+          <p:nvPr>
+            <p:ph idx="1"/>
+          </p:nvPr>
+        </p:nvSpPr>
+        <p:spPr/>
+        <p:txBody>
+          <a:bodyPr/>
+          <a:lstStyle/>
+          <a:p>
+            <a:r>
+              <a:rPr lang="zh-CN" altLang="en-US" dirty="0"/>
+              <a:t>对分类器的权重矩阵进行了</a:t>
+            </a:r>
+            <a:r>
+              <a:rPr lang="en-US" altLang="zh-CN" dirty="0"/>
+              <a:t>SVD</a:t>
+            </a:r>
+            <a:r>
+              <a:rPr lang="zh-CN" altLang="en-US" dirty="0"/>
+              <a:t>，提取到</a:t>
+            </a:r>
+            <a:r>
+              <a:rPr lang="zh-CN" altLang="en-US" dirty="0">
+                <a:solidFill>
+                  <a:srgbClr val="FF0000"/>
+                </a:solidFill>
+              </a:rPr>
+              <a:t>右奇异矩阵</a:t>
+            </a:r>
+            <a:endParaRPr lang="en-US" altLang="zh-CN" dirty="0">
+              <a:solidFill>
+                <a:srgbClr val="FF0000"/>
+              </a:solidFill>
+            </a:endParaRPr>
+          </a:p>
+          <a:p>
+            <a:r>
+              <a:rPr lang="zh-CN" altLang="en-US" dirty="0"/>
+              <a:t>右奇异矩阵的前</a:t>
+            </a:r>
+            <a:r>
+              <a:rPr lang="en-US" altLang="zh-CN" dirty="0"/>
+              <a:t>C</a:t>
+            </a:r>
+            <a:r>
+              <a:rPr lang="zh-CN" altLang="en-US" dirty="0"/>
+              <a:t>组为已知空间（行空间），后</a:t>
+            </a:r>
+            <a:r>
+              <a:rPr lang="en-US" altLang="zh-CN" dirty="0"/>
+              <a:t>(D-C)</a:t>
+            </a:r>
+            <a:r>
+              <a:rPr lang="zh-CN" altLang="en-US" dirty="0"/>
+              <a:t>组为未知空间（零空间），而</a:t>
+            </a:r>
+            <a:r>
+              <a:rPr lang="zh-CN" altLang="en-US" dirty="0">
+                <a:solidFill>
+                  <a:srgbClr val="FF0000"/>
+                </a:solidFill>
+              </a:rPr>
+              <a:t>未知空间的</a:t>
+            </a:r>
+            <a:r>
+              <a:rPr lang="en-US" altLang="zh-CN" dirty="0">
+                <a:solidFill>
+                  <a:srgbClr val="FF0000"/>
+                </a:solidFill>
+              </a:rPr>
+              <a:t>2</a:t>
+            </a:r>
+            <a:r>
+              <a:rPr lang="zh-CN" altLang="en-US" dirty="0">
+                <a:solidFill>
+                  <a:srgbClr val="FF0000"/>
+                </a:solidFill>
+              </a:rPr>
+              <a:t>范数呈现双峰</a:t>
+            </a:r>
+            <a:endParaRPr lang="en-US" altLang="zh-CN" dirty="0">
+              <a:solidFill>
+                <a:srgbClr val="FF0000"/>
+              </a:solidFill>
+            </a:endParaRPr>
+          </a:p>
+          <a:p>
+            <a:r>
+              <a:rPr lang="zh-CN" altLang="en-US" dirty="0"/>
+              <a:t>通过</a:t>
+            </a:r>
+            <a:r>
+              <a:rPr lang="en-US" altLang="zh-CN" dirty="0"/>
+              <a:t>GMM</a:t>
+            </a:r>
+            <a:r>
+              <a:rPr lang="zh-CN" altLang="en-US" dirty="0"/>
+              <a:t>可将</a:t>
+            </a:r>
+            <a:r>
+              <a:rPr lang="en-US" altLang="zh-CN" dirty="0"/>
+              <a:t>2</a:t>
+            </a:r>
+            <a:r>
+              <a:rPr lang="zh-CN" altLang="en-US" dirty="0"/>
+              <a:t>范数的分布，剥离为</a:t>
+            </a:r>
+            <a:r>
+              <a:rPr lang="en-US" altLang="zh-CN" dirty="0"/>
+              <a:t>2</a:t>
+            </a:r>
+            <a:r>
+              <a:rPr lang="zh-CN" altLang="en-US" dirty="0"/>
+              <a:t>个部分，未知空间中的</a:t>
+            </a:r>
+            <a:r>
+              <a:rPr lang="en-US" altLang="zh-CN" dirty="0"/>
+              <a:t>common</a:t>
+            </a:r>
+            <a:r>
+              <a:rPr lang="zh-CN" altLang="en-US" dirty="0"/>
+              <a:t> </a:t>
+            </a:r>
+            <a:r>
+              <a:rPr lang="en-US" altLang="zh-CN" dirty="0"/>
+              <a:t>+ </a:t>
+            </a:r>
+            <a:r>
+              <a:rPr lang="zh-CN" altLang="en-US" dirty="0"/>
+              <a:t>未知空间中的</a:t>
             </a:r>
             <a:r>
               <a:rPr lang="en-US" altLang="zh-CN" dirty="0"/>
               <a:t>private</a:t>
             </a:r>
+          </a:p>
+          <a:p>
             <a:r>
               <a:rPr lang="zh-CN" altLang="en-US" dirty="0"/>
-              <a:t>情况</a:t>
-            </a:r>
-          </a:p>
-        </p:txBody>
-      </p:sp>
-      <p:sp>
-        <p:nvSpPr>
-          <p:cNvPr id="3" name="内容占位符 2">
-            <a:extLst>
-              <a:ext uri="{FF2B5EF4-FFF2-40B4-BE49-F238E27FC236}">
-                <a16:creationId xmlns:a16="http://schemas.microsoft.com/office/drawing/2014/main" id="{1F455B42-788C-B7A3-CE28-18E11913D584}"/>
-              </a:ext>
-            </a:extLst>
-          </p:cNvPr>
-          <p:cNvSpPr>
-            <a:spLocks noGrp="1"/>
-          </p:cNvSpPr>
-          <p:nvPr>
-            <p:ph idx="1"/>
-          </p:nvPr>
-        </p:nvSpPr>
-        <p:spPr/>
-        <p:txBody>
-          <a:bodyPr/>
-          <a:lstStyle/>
+              <a:t>双峰分布图针对的对象，均是</a:t>
+            </a:r>
+            <a:r>
+              <a:rPr lang="en-US" altLang="zh-CN" dirty="0">
+                <a:solidFill>
+                  <a:srgbClr val="FF0000"/>
+                </a:solidFill>
+              </a:rPr>
+              <a:t>target</a:t>
+            </a:r>
+            <a:r>
+              <a:rPr lang="zh-CN" altLang="en-US" dirty="0">
+                <a:solidFill>
+                  <a:srgbClr val="FF0000"/>
+                </a:solidFill>
+              </a:rPr>
+              <a:t>上的数据</a:t>
+            </a:r>
+            <a:endParaRPr lang="en-US" altLang="zh-CN" dirty="0">
+              <a:solidFill>
+                <a:srgbClr val="FF0000"/>
+              </a:solidFill>
+            </a:endParaRPr>
+          </a:p>
           <a:p>
             <a:r>
               <a:rPr lang="zh-CN" altLang="en-US" dirty="0"/>
-              <a:t>问题抽象：</a:t>
+              <a:t>实例化边界，可通过</a:t>
             </a:r>
             <a:r>
               <a:rPr lang="en-US" altLang="zh-CN" dirty="0"/>
-              <a:t>source</a:t>
+              <a:t>private</a:t>
             </a:r>
             <a:r>
               <a:rPr lang="zh-CN" altLang="en-US" dirty="0"/>
-              <a:t>中只包含</a:t>
+              <a:t>的均值和第</a:t>
             </a:r>
             <a:r>
               <a:rPr lang="en-US" altLang="zh-CN" dirty="0"/>
-              <a:t>common</a:t>
+              <a:t>c</a:t>
             </a:r>
             <a:r>
               <a:rPr lang="zh-CN" altLang="en-US" dirty="0"/>
-              <a:t>不包含</a:t>
+              <a:t>类的未知空间</a:t>
             </a:r>
             <a:r>
               <a:rPr lang="en-US" altLang="zh-CN" dirty="0"/>
-              <a:t>source-private</a:t>
+              <a:t>2</a:t>
             </a:r>
             <a:r>
               <a:rPr lang="zh-CN" altLang="en-US" dirty="0"/>
-              <a:t>，而</a:t>
-            </a:r>
-            <a:r>
-              <a:rPr lang="en-US" altLang="zh-CN" dirty="0"/>
-              <a:t>target</a:t>
-            </a:r>
-            <a:r>
-              <a:rPr lang="zh-CN" altLang="en-US" dirty="0"/>
-              <a:t>中包含</a:t>
-            </a:r>
-            <a:r>
-              <a:rPr lang="en-US" altLang="zh-CN" dirty="0"/>
-              <a:t>common</a:t>
-            </a:r>
-            <a:r>
-              <a:rPr lang="zh-CN" altLang="en-US" dirty="0"/>
-              <a:t>和</a:t>
-            </a:r>
-            <a:r>
-              <a:rPr lang="en-US" altLang="zh-CN" dirty="0"/>
-              <a:t>target-private</a:t>
-            </a:r>
-            <a:r>
-              <a:rPr lang="zh-CN" altLang="en-US" dirty="0"/>
-              <a:t>，应该怎么办</a:t>
-            </a:r>
-            <a:endParaRPr lang="en-US" altLang="zh-CN" dirty="0"/>
-          </a:p>
-          <a:p>
-            <a:pPr marL="0" indent="0">
-              <a:buNone/>
-            </a:pPr>
-            <a:r>
-              <a:rPr lang="en-US" altLang="zh-CN" dirty="0"/>
-              <a:t>【</a:t>
-            </a:r>
-            <a:r>
-              <a:rPr lang="zh-CN" altLang="en-US" dirty="0"/>
-              <a:t>还是不太明白</a:t>
-            </a:r>
-            <a:r>
-              <a:rPr lang="en-US" altLang="zh-CN" dirty="0"/>
-              <a:t>】</a:t>
-            </a:r>
-          </a:p>
-          <a:p>
-            <a:pPr marL="0" indent="0">
-              <a:buNone/>
-            </a:pPr>
-            <a:endParaRPr lang="en-US" altLang="zh-CN" dirty="0"/>
-          </a:p>
-          <a:p>
-            <a:r>
-              <a:rPr lang="en-US" altLang="zh-CN" dirty="0"/>
-              <a:t>Open-partial</a:t>
-            </a:r>
-            <a:r>
-              <a:rPr lang="zh-CN" altLang="en-US" dirty="0"/>
-              <a:t>变成</a:t>
-            </a:r>
-            <a:r>
-              <a:rPr lang="en-US" altLang="zh-CN" dirty="0"/>
-              <a:t>Open-set</a:t>
-            </a:r>
-          </a:p>
-          <a:p>
-            <a:r>
-              <a:rPr lang="zh-CN" altLang="en-US" dirty="0"/>
-              <a:t>利用熵最小化进行</a:t>
-            </a:r>
-            <a:r>
-              <a:rPr lang="en-US" altLang="zh-CN" dirty="0"/>
-              <a:t>common</a:t>
-            </a:r>
-            <a:r>
-              <a:rPr lang="zh-CN" altLang="en-US" dirty="0"/>
-              <a:t>类别的特征对齐</a:t>
-            </a:r>
-            <a:endParaRPr lang="en-US" altLang="zh-CN" dirty="0"/>
-          </a:p>
-          <a:p>
-            <a:r>
-              <a:rPr lang="zh-CN" altLang="en-US" dirty="0"/>
-              <a:t>利用不确定性估计，区分</a:t>
-            </a:r>
-            <a:r>
-              <a:rPr lang="en-US" altLang="zh-CN" dirty="0"/>
-              <a:t>known</a:t>
-            </a:r>
-            <a:r>
-              <a:rPr lang="zh-CN" altLang="en-US" dirty="0"/>
-              <a:t>和</a:t>
-            </a:r>
-            <a:r>
-              <a:rPr lang="en-US" altLang="zh-CN" dirty="0"/>
-              <a:t>unknown</a:t>
-            </a:r>
-            <a:r>
-              <a:rPr lang="zh-CN" altLang="en-US" dirty="0"/>
-              <a:t>的数据</a:t>
-            </a:r>
+              <a:t>范数进行计算</a:t>
+            </a:r>
+            <a:endParaRPr lang="zh-CN" altLang="en-US" dirty="0">
+              <a:solidFill>
+                <a:srgbClr val="FF0000"/>
+              </a:solidFill>
+            </a:endParaRPr>
           </a:p>
         </p:txBody>
       </p:sp>
     </p:spTree>
     <p:extLst>
       <p:ext uri="{BB962C8B-B14F-4D97-AF65-F5344CB8AC3E}">
-        <p14:creationId xmlns:p14="http://schemas.microsoft.com/office/powerpoint/2010/main" val="3250914628"/>
+        <p14:creationId xmlns:p14="http://schemas.microsoft.com/office/powerpoint/2010/main" val="1698240290"/>
       </p:ext>
     </p:extLst>
   </p:cSld>

</xml_diff>